<commit_message>
updated the archi diagram
</commit_message>
<xml_diff>
--- a/plots/architecture_POWERPOINT.pptx
+++ b/plots/architecture_POWERPOINT.pptx
@@ -104,6 +104,11 @@
       </a:defRPr>
     </a:lvl9pPr>
   </p:defaultTextStyle>
+  <p:extLst>
+    <p:ext uri="{EFAFB233-063F-42B5-8137-9DF3F51BA10A}">
+      <p15:sldGuideLst xmlns:p15="http://schemas.microsoft.com/office/powerpoint/2012/main"/>
+    </p:ext>
+  </p:extLst>
 </p:presentation>
 </file>
 
@@ -3356,10 +3361,10 @@
         </p:nvGrpSpPr>
         <p:grpSpPr>
           <a:xfrm>
-            <a:off x="1005840" y="2873830"/>
-            <a:ext cx="7511143" cy="2795450"/>
-            <a:chOff x="1005840" y="2873830"/>
-            <a:chExt cx="7511143" cy="2795450"/>
+            <a:off x="1005840" y="2873829"/>
+            <a:ext cx="7511143" cy="2969361"/>
+            <a:chOff x="1005840" y="2873829"/>
+            <a:chExt cx="7511143" cy="2969361"/>
           </a:xfrm>
         </p:grpSpPr>
         <p:sp>
@@ -3376,8 +3381,8 @@
           </p:nvSpPr>
           <p:spPr>
             <a:xfrm>
-              <a:off x="1005840" y="2873830"/>
-              <a:ext cx="7511143" cy="2795450"/>
+              <a:off x="1005840" y="2873829"/>
+              <a:ext cx="7511143" cy="2969361"/>
             </a:xfrm>
             <a:prstGeom prst="rect">
               <a:avLst/>
@@ -3410,7 +3415,7 @@
             <a:lstStyle/>
             <a:p>
               <a:pPr algn="ctr"/>
-              <a:endParaRPr lang="en-US"/>
+              <a:endParaRPr lang="en-US" dirty="0"/>
             </a:p>
           </p:txBody>
         </p:sp>
@@ -3542,69 +3547,137 @@
               </a:p>
             </p:txBody>
           </p:sp>
-          <p:sp>
-            <p:nvSpPr>
-              <p:cNvPr id="5" name="Rectangle 4">
-                <a:extLst>
-                  <a:ext uri="{FF2B5EF4-FFF2-40B4-BE49-F238E27FC236}">
-                    <a16:creationId xmlns:a16="http://schemas.microsoft.com/office/drawing/2014/main" id="{B3A0A0AC-B9C7-93E4-A1D2-5B10D719C8C2}"/>
-                  </a:ext>
-                </a:extLst>
-              </p:cNvPr>
-              <p:cNvSpPr/>
-              <p:nvPr/>
-            </p:nvSpPr>
-            <p:spPr>
-              <a:xfrm>
-                <a:off x="1208946" y="3930189"/>
-                <a:ext cx="685800" cy="685800"/>
-              </a:xfrm>
-              <a:prstGeom prst="rect">
-                <a:avLst/>
-              </a:prstGeom>
-              <a:solidFill>
-                <a:schemeClr val="bg1"/>
-              </a:solidFill>
-              <a:ln>
-                <a:solidFill>
-                  <a:schemeClr val="tx1"/>
-                </a:solidFill>
-              </a:ln>
-            </p:spPr>
-            <p:style>
-              <a:lnRef idx="2">
-                <a:schemeClr val="accent1">
-                  <a:shade val="50000"/>
-                </a:schemeClr>
-              </a:lnRef>
-              <a:fillRef idx="1">
-                <a:schemeClr val="accent1"/>
-              </a:fillRef>
-              <a:effectRef idx="0">
-                <a:schemeClr val="accent1"/>
-              </a:effectRef>
-              <a:fontRef idx="minor">
-                <a:schemeClr val="lt1"/>
-              </a:fontRef>
-            </p:style>
-            <p:txBody>
-              <a:bodyPr rtlCol="0" anchor="ctr"/>
-              <a:lstStyle/>
-              <a:p>
-                <a:pPr algn="ctr"/>
-                <a:r>
-                  <a:rPr lang="en-US" dirty="0">
+          <mc:AlternateContent xmlns:mc="http://schemas.openxmlformats.org/markup-compatibility/2006">
+            <mc:Choice xmlns:a14="http://schemas.microsoft.com/office/drawing/2010/main" Requires="a14">
+              <p:sp>
+                <p:nvSpPr>
+                  <p:cNvPr id="5" name="Rectangle 4">
+                    <a:extLst>
+                      <a:ext uri="{FF2B5EF4-FFF2-40B4-BE49-F238E27FC236}">
+                        <a16:creationId xmlns:a16="http://schemas.microsoft.com/office/drawing/2014/main" id="{B3A0A0AC-B9C7-93E4-A1D2-5B10D719C8C2}"/>
+                      </a:ext>
+                    </a:extLst>
+                  </p:cNvPr>
+                  <p:cNvSpPr/>
+                  <p:nvPr/>
+                </p:nvSpPr>
+                <p:spPr>
+                  <a:xfrm>
+                    <a:off x="1208946" y="3930189"/>
+                    <a:ext cx="685800" cy="685800"/>
+                  </a:xfrm>
+                  <a:prstGeom prst="rect">
+                    <a:avLst/>
+                  </a:prstGeom>
+                  <a:solidFill>
+                    <a:schemeClr val="bg1"/>
+                  </a:solidFill>
+                  <a:ln>
                     <a:solidFill>
                       <a:schemeClr val="tx1"/>
                     </a:solidFill>
-                  </a:rPr>
-                  <a:t>X</a:t>
-                </a:r>
-              </a:p>
-            </p:txBody>
-          </p:sp>
-          <mc:AlternateContent xmlns:mc="http://schemas.openxmlformats.org/markup-compatibility/2006">
-            <mc:Choice xmlns:a14="http://schemas.microsoft.com/office/drawing/2010/main" Requires="a14">
+                  </a:ln>
+                </p:spPr>
+                <p:style>
+                  <a:lnRef idx="2">
+                    <a:schemeClr val="accent1">
+                      <a:shade val="50000"/>
+                    </a:schemeClr>
+                  </a:lnRef>
+                  <a:fillRef idx="1">
+                    <a:schemeClr val="accent1"/>
+                  </a:fillRef>
+                  <a:effectRef idx="0">
+                    <a:schemeClr val="accent1"/>
+                  </a:effectRef>
+                  <a:fontRef idx="minor">
+                    <a:schemeClr val="lt1"/>
+                  </a:fontRef>
+                </p:style>
+                <p:txBody>
+                  <a:bodyPr rtlCol="0" anchor="ctr"/>
+                  <a:lstStyle/>
+                  <a:p>
+                    <a:pPr algn="ctr"/>
+                    <a14:m>
+                      <m:oMathPara xmlns:m="http://schemas.openxmlformats.org/officeDocument/2006/math">
+                        <m:oMathParaPr>
+                          <m:jc m:val="centerGroup"/>
+                        </m:oMathParaPr>
+                        <m:oMath xmlns:m="http://schemas.openxmlformats.org/officeDocument/2006/math">
+                          <m:r>
+                            <a:rPr lang="en-US" b="0" i="1" smtClean="0">
+                              <a:solidFill>
+                                <a:schemeClr val="tx1"/>
+                              </a:solidFill>
+                              <a:latin typeface="Cambria Math" panose="02040503050406030204" pitchFamily="18" charset="0"/>
+                            </a:rPr>
+                            <m:t>𝑋</m:t>
+                          </m:r>
+                        </m:oMath>
+                      </m:oMathPara>
+                    </a14:m>
+                    <a:endParaRPr lang="en-US" b="0" dirty="0">
+                      <a:solidFill>
+                        <a:schemeClr val="tx1"/>
+                      </a:solidFill>
+                    </a:endParaRPr>
+                  </a:p>
+                </p:txBody>
+              </p:sp>
+            </mc:Choice>
+            <mc:Fallback>
+              <p:sp>
+                <p:nvSpPr>
+                  <p:cNvPr id="5" name="Rectangle 4">
+                    <a:extLst>
+                      <a:ext uri="{FF2B5EF4-FFF2-40B4-BE49-F238E27FC236}">
+                        <a16:creationId xmlns:a16="http://schemas.microsoft.com/office/drawing/2014/main" id="{B3A0A0AC-B9C7-93E4-A1D2-5B10D719C8C2}"/>
+                      </a:ext>
+                    </a:extLst>
+                  </p:cNvPr>
+                  <p:cNvSpPr>
+                    <a:spLocks noRot="1" noChangeAspect="1" noMove="1" noResize="1" noEditPoints="1" noAdjustHandles="1" noChangeArrowheads="1" noChangeShapeType="1" noTextEdit="1"/>
+                  </p:cNvSpPr>
+                  <p:nvPr/>
+                </p:nvSpPr>
+                <p:spPr>
+                  <a:xfrm>
+                    <a:off x="1208946" y="3930189"/>
+                    <a:ext cx="685800" cy="685800"/>
+                  </a:xfrm>
+                  <a:prstGeom prst="rect">
+                    <a:avLst/>
+                  </a:prstGeom>
+                  <a:blipFill>
+                    <a:blip r:embed="rId2"/>
+                    <a:stretch>
+                      <a:fillRect/>
+                    </a:stretch>
+                  </a:blipFill>
+                  <a:ln>
+                    <a:solidFill>
+                      <a:schemeClr val="tx1"/>
+                    </a:solidFill>
+                  </a:ln>
+                </p:spPr>
+                <p:txBody>
+                  <a:bodyPr/>
+                  <a:lstStyle/>
+                  <a:p>
+                    <a:r>
+                      <a:rPr lang="en-US">
+                        <a:noFill/>
+                      </a:rPr>
+                      <a:t> </a:t>
+                    </a:r>
+                  </a:p>
+                </p:txBody>
+              </p:sp>
+            </mc:Fallback>
+          </mc:AlternateContent>
+          <mc:AlternateContent xmlns:mc="http://schemas.openxmlformats.org/markup-compatibility/2006" xmlns:a14="http://schemas.microsoft.com/office/drawing/2010/main">
+            <mc:Choice Requires="a14">
               <p:sp>
                 <p:nvSpPr>
                   <p:cNvPr id="6" name="Rounded Rectangle 5">
@@ -3735,7 +3808,7 @@
                 </p:txBody>
               </p:sp>
             </mc:Choice>
-            <mc:Fallback>
+            <mc:Fallback xmlns="">
               <p:sp>
                 <p:nvSpPr>
                   <p:cNvPr id="6" name="Rounded Rectangle 5">
@@ -3759,7 +3832,7 @@
                     <a:avLst/>
                   </a:prstGeom>
                   <a:blipFill>
-                    <a:blip r:embed="rId2"/>
+                    <a:blip r:embed="rId3"/>
                     <a:stretch>
                       <a:fillRect/>
                     </a:stretch>
@@ -3783,8 +3856,8 @@
               </p:sp>
             </mc:Fallback>
           </mc:AlternateContent>
-          <mc:AlternateContent xmlns:mc="http://schemas.openxmlformats.org/markup-compatibility/2006">
-            <mc:Choice xmlns:a14="http://schemas.microsoft.com/office/drawing/2010/main" Requires="a14">
+          <mc:AlternateContent xmlns:mc="http://schemas.openxmlformats.org/markup-compatibility/2006" xmlns:a14="http://schemas.microsoft.com/office/drawing/2010/main">
+            <mc:Choice Requires="a14">
               <p:sp>
                 <p:nvSpPr>
                   <p:cNvPr id="7" name="Rounded Rectangle 6">
@@ -3915,7 +3988,7 @@
                 </p:txBody>
               </p:sp>
             </mc:Choice>
-            <mc:Fallback>
+            <mc:Fallback xmlns="">
               <p:sp>
                 <p:nvSpPr>
                   <p:cNvPr id="7" name="Rounded Rectangle 6">
@@ -3939,7 +4012,7 @@
                     <a:avLst/>
                   </a:prstGeom>
                   <a:blipFill>
-                    <a:blip r:embed="rId3"/>
+                    <a:blip r:embed="rId4"/>
                     <a:stretch>
                       <a:fillRect/>
                     </a:stretch>
@@ -3963,297 +4036,620 @@
               </p:sp>
             </mc:Fallback>
           </mc:AlternateContent>
-          <p:sp>
-            <p:nvSpPr>
-              <p:cNvPr id="8" name="Rectangle 7">
-                <a:extLst>
-                  <a:ext uri="{FF2B5EF4-FFF2-40B4-BE49-F238E27FC236}">
-                    <a16:creationId xmlns:a16="http://schemas.microsoft.com/office/drawing/2014/main" id="{4A1F60CF-F630-9DB4-0D65-281BD1419ED5}"/>
-                  </a:ext>
-                </a:extLst>
-              </p:cNvPr>
-              <p:cNvSpPr/>
-              <p:nvPr/>
-            </p:nvSpPr>
-            <p:spPr>
-              <a:xfrm>
-                <a:off x="4878265" y="3168162"/>
-                <a:ext cx="685800" cy="685800"/>
-              </a:xfrm>
-              <a:prstGeom prst="rect">
-                <a:avLst/>
-              </a:prstGeom>
-              <a:solidFill>
-                <a:schemeClr val="bg1"/>
-              </a:solidFill>
-              <a:ln>
-                <a:solidFill>
-                  <a:schemeClr val="tx1"/>
-                </a:solidFill>
-              </a:ln>
-            </p:spPr>
-            <p:style>
-              <a:lnRef idx="2">
-                <a:schemeClr val="accent1">
-                  <a:shade val="50000"/>
-                </a:schemeClr>
-              </a:lnRef>
-              <a:fillRef idx="1">
-                <a:schemeClr val="accent1"/>
-              </a:fillRef>
-              <a:effectRef idx="0">
-                <a:schemeClr val="accent1"/>
-              </a:effectRef>
-              <a:fontRef idx="minor">
-                <a:schemeClr val="lt1"/>
-              </a:fontRef>
-            </p:style>
-            <p:txBody>
-              <a:bodyPr rtlCol="0" anchor="ctr"/>
-              <a:lstStyle/>
-              <a:p>
-                <a:pPr algn="ctr"/>
-                <a:r>
-                  <a:rPr lang="en-US" dirty="0">
+          <mc:AlternateContent xmlns:mc="http://schemas.openxmlformats.org/markup-compatibility/2006">
+            <mc:Choice xmlns:a14="http://schemas.microsoft.com/office/drawing/2010/main" Requires="a14">
+              <p:sp>
+                <p:nvSpPr>
+                  <p:cNvPr id="8" name="Rectangle 7">
+                    <a:extLst>
+                      <a:ext uri="{FF2B5EF4-FFF2-40B4-BE49-F238E27FC236}">
+                        <a16:creationId xmlns:a16="http://schemas.microsoft.com/office/drawing/2014/main" id="{4A1F60CF-F630-9DB4-0D65-281BD1419ED5}"/>
+                      </a:ext>
+                    </a:extLst>
+                  </p:cNvPr>
+                  <p:cNvSpPr/>
+                  <p:nvPr/>
+                </p:nvSpPr>
+                <p:spPr>
+                  <a:xfrm>
+                    <a:off x="4878265" y="3168162"/>
+                    <a:ext cx="685800" cy="685800"/>
+                  </a:xfrm>
+                  <a:prstGeom prst="rect">
+                    <a:avLst/>
+                  </a:prstGeom>
+                  <a:solidFill>
+                    <a:schemeClr val="bg1"/>
+                  </a:solidFill>
+                  <a:ln>
                     <a:solidFill>
                       <a:schemeClr val="tx1"/>
                     </a:solidFill>
-                  </a:rPr>
-                  <a:t>P</a:t>
-                </a:r>
-                <a:r>
-                  <a:rPr lang="en-US" baseline="-25000" dirty="0">
+                  </a:ln>
+                </p:spPr>
+                <p:style>
+                  <a:lnRef idx="2">
+                    <a:schemeClr val="accent1">
+                      <a:shade val="50000"/>
+                    </a:schemeClr>
+                  </a:lnRef>
+                  <a:fillRef idx="1">
+                    <a:schemeClr val="accent1"/>
+                  </a:fillRef>
+                  <a:effectRef idx="0">
+                    <a:schemeClr val="accent1"/>
+                  </a:effectRef>
+                  <a:fontRef idx="minor">
+                    <a:schemeClr val="lt1"/>
+                  </a:fontRef>
+                </p:style>
+                <p:txBody>
+                  <a:bodyPr rtlCol="0" anchor="ctr"/>
+                  <a:lstStyle/>
+                  <a:p>
+                    <a:pPr algn="ctr"/>
+                    <a14:m>
+                      <m:oMathPara xmlns:m="http://schemas.openxmlformats.org/officeDocument/2006/math">
+                        <m:oMathParaPr>
+                          <m:jc m:val="centerGroup"/>
+                        </m:oMathParaPr>
+                        <m:oMath xmlns:m="http://schemas.openxmlformats.org/officeDocument/2006/math">
+                          <m:r>
+                            <a:rPr lang="en-US" i="1" dirty="0" smtClean="0">
+                              <a:solidFill>
+                                <a:schemeClr val="tx1"/>
+                              </a:solidFill>
+                              <a:latin typeface="Cambria Math" panose="02040503050406030204" pitchFamily="18" charset="0"/>
+                            </a:rPr>
+                            <m:t>𝑃</m:t>
+                          </m:r>
+                          <m:r>
+                            <a:rPr lang="en-US" i="1" baseline="-25000" dirty="0">
+                              <a:solidFill>
+                                <a:schemeClr val="tx1"/>
+                              </a:solidFill>
+                              <a:latin typeface="Cambria Math" panose="02040503050406030204" pitchFamily="18" charset="0"/>
+                            </a:rPr>
+                            <m:t>1</m:t>
+                          </m:r>
+                        </m:oMath>
+                      </m:oMathPara>
+                    </a14:m>
+                    <a:endParaRPr lang="en-US" baseline="-25000" dirty="0">
+                      <a:solidFill>
+                        <a:schemeClr val="tx1"/>
+                      </a:solidFill>
+                    </a:endParaRPr>
+                  </a:p>
+                </p:txBody>
+              </p:sp>
+            </mc:Choice>
+            <mc:Fallback>
+              <p:sp>
+                <p:nvSpPr>
+                  <p:cNvPr id="8" name="Rectangle 7">
+                    <a:extLst>
+                      <a:ext uri="{FF2B5EF4-FFF2-40B4-BE49-F238E27FC236}">
+                        <a16:creationId xmlns:a16="http://schemas.microsoft.com/office/drawing/2014/main" id="{4A1F60CF-F630-9DB4-0D65-281BD1419ED5}"/>
+                      </a:ext>
+                    </a:extLst>
+                  </p:cNvPr>
+                  <p:cNvSpPr>
+                    <a:spLocks noRot="1" noChangeAspect="1" noMove="1" noResize="1" noEditPoints="1" noAdjustHandles="1" noChangeArrowheads="1" noChangeShapeType="1" noTextEdit="1"/>
+                  </p:cNvSpPr>
+                  <p:nvPr/>
+                </p:nvSpPr>
+                <p:spPr>
+                  <a:xfrm>
+                    <a:off x="4878265" y="3168162"/>
+                    <a:ext cx="685800" cy="685800"/>
+                  </a:xfrm>
+                  <a:prstGeom prst="rect">
+                    <a:avLst/>
+                  </a:prstGeom>
+                  <a:blipFill>
+                    <a:blip r:embed="rId5"/>
+                    <a:stretch>
+                      <a:fillRect/>
+                    </a:stretch>
+                  </a:blipFill>
+                  <a:ln>
                     <a:solidFill>
                       <a:schemeClr val="tx1"/>
                     </a:solidFill>
-                  </a:rPr>
-                  <a:t>1</a:t>
-                </a:r>
-              </a:p>
-            </p:txBody>
-          </p:sp>
-          <p:sp>
-            <p:nvSpPr>
-              <p:cNvPr id="9" name="Rectangle 8">
-                <a:extLst>
-                  <a:ext uri="{FF2B5EF4-FFF2-40B4-BE49-F238E27FC236}">
-                    <a16:creationId xmlns:a16="http://schemas.microsoft.com/office/drawing/2014/main" id="{24BB2710-938B-0137-A54C-DF8211ACCB1A}"/>
-                  </a:ext>
-                </a:extLst>
-              </p:cNvPr>
-              <p:cNvSpPr/>
-              <p:nvPr/>
-            </p:nvSpPr>
-            <p:spPr>
-              <a:xfrm>
-                <a:off x="7308389" y="3168162"/>
-                <a:ext cx="685800" cy="685800"/>
-              </a:xfrm>
-              <a:prstGeom prst="rect">
-                <a:avLst/>
-              </a:prstGeom>
-              <a:solidFill>
-                <a:schemeClr val="bg1"/>
-              </a:solidFill>
-              <a:ln>
-                <a:solidFill>
-                  <a:schemeClr val="tx1"/>
-                </a:solidFill>
-              </a:ln>
-            </p:spPr>
-            <p:style>
-              <a:lnRef idx="2">
-                <a:schemeClr val="accent1">
-                  <a:shade val="50000"/>
-                </a:schemeClr>
-              </a:lnRef>
-              <a:fillRef idx="1">
-                <a:schemeClr val="accent1"/>
-              </a:fillRef>
-              <a:effectRef idx="0">
-                <a:schemeClr val="accent1"/>
-              </a:effectRef>
-              <a:fontRef idx="minor">
-                <a:schemeClr val="lt1"/>
-              </a:fontRef>
-            </p:style>
-            <p:txBody>
-              <a:bodyPr rtlCol="0" anchor="ctr"/>
-              <a:lstStyle/>
-              <a:p>
-                <a:pPr algn="ctr"/>
-                <a:r>
-                  <a:rPr lang="en-US" dirty="0">
+                  </a:ln>
+                </p:spPr>
+                <p:txBody>
+                  <a:bodyPr/>
+                  <a:lstStyle/>
+                  <a:p>
+                    <a:r>
+                      <a:rPr lang="en-US">
+                        <a:noFill/>
+                      </a:rPr>
+                      <a:t> </a:t>
+                    </a:r>
+                  </a:p>
+                </p:txBody>
+              </p:sp>
+            </mc:Fallback>
+          </mc:AlternateContent>
+          <mc:AlternateContent xmlns:mc="http://schemas.openxmlformats.org/markup-compatibility/2006">
+            <mc:Choice xmlns:a14="http://schemas.microsoft.com/office/drawing/2010/main" Requires="a14">
+              <p:sp>
+                <p:nvSpPr>
+                  <p:cNvPr id="9" name="Rectangle 8">
+                    <a:extLst>
+                      <a:ext uri="{FF2B5EF4-FFF2-40B4-BE49-F238E27FC236}">
+                        <a16:creationId xmlns:a16="http://schemas.microsoft.com/office/drawing/2014/main" id="{24BB2710-938B-0137-A54C-DF8211ACCB1A}"/>
+                      </a:ext>
+                    </a:extLst>
+                  </p:cNvPr>
+                  <p:cNvSpPr/>
+                  <p:nvPr/>
+                </p:nvSpPr>
+                <p:spPr>
+                  <a:xfrm>
+                    <a:off x="7308389" y="3168162"/>
+                    <a:ext cx="685800" cy="685800"/>
+                  </a:xfrm>
+                  <a:prstGeom prst="rect">
+                    <a:avLst/>
+                  </a:prstGeom>
+                  <a:solidFill>
+                    <a:schemeClr val="bg1"/>
+                  </a:solidFill>
+                  <a:ln>
                     <a:solidFill>
                       <a:schemeClr val="tx1"/>
                     </a:solidFill>
-                  </a:rPr>
-                  <a:t>Y</a:t>
-                </a:r>
-                <a:r>
-                  <a:rPr lang="en-US" baseline="-25000" dirty="0">
+                  </a:ln>
+                </p:spPr>
+                <p:style>
+                  <a:lnRef idx="2">
+                    <a:schemeClr val="accent1">
+                      <a:shade val="50000"/>
+                    </a:schemeClr>
+                  </a:lnRef>
+                  <a:fillRef idx="1">
+                    <a:schemeClr val="accent1"/>
+                  </a:fillRef>
+                  <a:effectRef idx="0">
+                    <a:schemeClr val="accent1"/>
+                  </a:effectRef>
+                  <a:fontRef idx="minor">
+                    <a:schemeClr val="lt1"/>
+                  </a:fontRef>
+                </p:style>
+                <p:txBody>
+                  <a:bodyPr rtlCol="0" anchor="ctr"/>
+                  <a:lstStyle/>
+                  <a:p>
+                    <a:pPr algn="ctr"/>
+                    <a14:m>
+                      <m:oMathPara xmlns:m="http://schemas.openxmlformats.org/officeDocument/2006/math">
+                        <m:oMathParaPr>
+                          <m:jc m:val="centerGroup"/>
+                        </m:oMathParaPr>
+                        <m:oMath xmlns:m="http://schemas.openxmlformats.org/officeDocument/2006/math">
+                          <m:sSub>
+                            <m:sSubPr>
+                              <m:ctrlPr>
+                                <a:rPr lang="en-US" b="0" i="1" smtClean="0">
+                                  <a:solidFill>
+                                    <a:schemeClr val="tx1"/>
+                                  </a:solidFill>
+                                  <a:latin typeface="Cambria Math" panose="02040503050406030204" pitchFamily="18" charset="0"/>
+                                </a:rPr>
+                              </m:ctrlPr>
+                            </m:sSubPr>
+                            <m:e>
+                              <m:acc>
+                                <m:accPr>
+                                  <m:chr m:val="̂"/>
+                                  <m:ctrlPr>
+                                    <a:rPr lang="en-US" b="0" i="1" smtClean="0">
+                                      <a:solidFill>
+                                        <a:schemeClr val="tx1"/>
+                                      </a:solidFill>
+                                      <a:latin typeface="Cambria Math" panose="02040503050406030204" pitchFamily="18" charset="0"/>
+                                    </a:rPr>
+                                  </m:ctrlPr>
+                                </m:accPr>
+                                <m:e>
+                                  <m:r>
+                                    <a:rPr lang="en-US" b="0" i="1" smtClean="0">
+                                      <a:solidFill>
+                                        <a:schemeClr val="tx1"/>
+                                      </a:solidFill>
+                                      <a:latin typeface="Cambria Math" panose="02040503050406030204" pitchFamily="18" charset="0"/>
+                                    </a:rPr>
+                                    <m:t>𝑦</m:t>
+                                  </m:r>
+                                </m:e>
+                              </m:acc>
+                            </m:e>
+                            <m:sub>
+                              <m:r>
+                                <a:rPr lang="en-US" b="0" i="1" smtClean="0">
+                                  <a:solidFill>
+                                    <a:schemeClr val="tx1"/>
+                                  </a:solidFill>
+                                  <a:latin typeface="Cambria Math" panose="02040503050406030204" pitchFamily="18" charset="0"/>
+                                </a:rPr>
+                                <m:t>1</m:t>
+                              </m:r>
+                            </m:sub>
+                          </m:sSub>
+                        </m:oMath>
+                      </m:oMathPara>
+                    </a14:m>
+                    <a:endParaRPr lang="en-US" b="0" dirty="0">
+                      <a:solidFill>
+                        <a:schemeClr val="tx1"/>
+                      </a:solidFill>
+                    </a:endParaRPr>
+                  </a:p>
+                </p:txBody>
+              </p:sp>
+            </mc:Choice>
+            <mc:Fallback>
+              <p:sp>
+                <p:nvSpPr>
+                  <p:cNvPr id="9" name="Rectangle 8">
+                    <a:extLst>
+                      <a:ext uri="{FF2B5EF4-FFF2-40B4-BE49-F238E27FC236}">
+                        <a16:creationId xmlns:a16="http://schemas.microsoft.com/office/drawing/2014/main" id="{24BB2710-938B-0137-A54C-DF8211ACCB1A}"/>
+                      </a:ext>
+                    </a:extLst>
+                  </p:cNvPr>
+                  <p:cNvSpPr>
+                    <a:spLocks noRot="1" noChangeAspect="1" noMove="1" noResize="1" noEditPoints="1" noAdjustHandles="1" noChangeArrowheads="1" noChangeShapeType="1" noTextEdit="1"/>
+                  </p:cNvSpPr>
+                  <p:nvPr/>
+                </p:nvSpPr>
+                <p:spPr>
+                  <a:xfrm>
+                    <a:off x="7308389" y="3168162"/>
+                    <a:ext cx="685800" cy="685800"/>
+                  </a:xfrm>
+                  <a:prstGeom prst="rect">
+                    <a:avLst/>
+                  </a:prstGeom>
+                  <a:blipFill>
+                    <a:blip r:embed="rId6"/>
+                    <a:stretch>
+                      <a:fillRect/>
+                    </a:stretch>
+                  </a:blipFill>
+                  <a:ln>
                     <a:solidFill>
                       <a:schemeClr val="tx1"/>
                     </a:solidFill>
-                  </a:rPr>
-                  <a:t>1</a:t>
-                </a:r>
-                <a:endParaRPr lang="en-US" dirty="0">
+                  </a:ln>
+                </p:spPr>
+                <p:txBody>
+                  <a:bodyPr/>
+                  <a:lstStyle/>
+                  <a:p>
+                    <a:r>
+                      <a:rPr lang="en-US">
+                        <a:noFill/>
+                      </a:rPr>
+                      <a:t> </a:t>
+                    </a:r>
+                  </a:p>
+                </p:txBody>
+              </p:sp>
+            </mc:Fallback>
+          </mc:AlternateContent>
+          <mc:AlternateContent xmlns:mc="http://schemas.openxmlformats.org/markup-compatibility/2006">
+            <mc:Choice xmlns:a14="http://schemas.microsoft.com/office/drawing/2010/main" Requires="a14">
+              <p:sp>
+                <p:nvSpPr>
+                  <p:cNvPr id="10" name="Rectangle 9">
+                    <a:extLst>
+                      <a:ext uri="{FF2B5EF4-FFF2-40B4-BE49-F238E27FC236}">
+                        <a16:creationId xmlns:a16="http://schemas.microsoft.com/office/drawing/2014/main" id="{4F9F89F7-56EA-4811-7AF8-CC1B32B84128}"/>
+                      </a:ext>
+                    </a:extLst>
+                  </p:cNvPr>
+                  <p:cNvSpPr/>
+                  <p:nvPr/>
+                </p:nvSpPr>
+                <p:spPr>
+                  <a:xfrm>
+                    <a:off x="4878265" y="4692216"/>
+                    <a:ext cx="685800" cy="685800"/>
+                  </a:xfrm>
+                  <a:prstGeom prst="rect">
+                    <a:avLst/>
+                  </a:prstGeom>
                   <a:solidFill>
-                    <a:schemeClr val="tx1"/>
+                    <a:schemeClr val="bg1"/>
                   </a:solidFill>
-                </a:endParaRPr>
-              </a:p>
-            </p:txBody>
-          </p:sp>
-          <p:sp>
-            <p:nvSpPr>
-              <p:cNvPr id="10" name="Rectangle 9">
-                <a:extLst>
-                  <a:ext uri="{FF2B5EF4-FFF2-40B4-BE49-F238E27FC236}">
-                    <a16:creationId xmlns:a16="http://schemas.microsoft.com/office/drawing/2014/main" id="{4F9F89F7-56EA-4811-7AF8-CC1B32B84128}"/>
-                  </a:ext>
-                </a:extLst>
-              </p:cNvPr>
-              <p:cNvSpPr/>
-              <p:nvPr/>
-            </p:nvSpPr>
-            <p:spPr>
-              <a:xfrm>
-                <a:off x="4878265" y="4692216"/>
-                <a:ext cx="685800" cy="685800"/>
-              </a:xfrm>
-              <a:prstGeom prst="rect">
-                <a:avLst/>
-              </a:prstGeom>
-              <a:solidFill>
-                <a:schemeClr val="bg1"/>
-              </a:solidFill>
-              <a:ln>
-                <a:solidFill>
-                  <a:schemeClr val="tx1"/>
-                </a:solidFill>
-              </a:ln>
-            </p:spPr>
-            <p:style>
-              <a:lnRef idx="2">
-                <a:schemeClr val="accent1">
-                  <a:shade val="50000"/>
-                </a:schemeClr>
-              </a:lnRef>
-              <a:fillRef idx="1">
-                <a:schemeClr val="accent1"/>
-              </a:fillRef>
-              <a:effectRef idx="0">
-                <a:schemeClr val="accent1"/>
-              </a:effectRef>
-              <a:fontRef idx="minor">
-                <a:schemeClr val="lt1"/>
-              </a:fontRef>
-            </p:style>
-            <p:txBody>
-              <a:bodyPr rtlCol="0" anchor="ctr"/>
-              <a:lstStyle/>
-              <a:p>
-                <a:pPr algn="ctr"/>
-                <a:r>
-                  <a:rPr lang="en-US" dirty="0">
+                  <a:ln>
                     <a:solidFill>
                       <a:schemeClr val="tx1"/>
                     </a:solidFill>
-                  </a:rPr>
-                  <a:t>P</a:t>
-                </a:r>
-                <a:r>
-                  <a:rPr lang="en-US" baseline="-25000" dirty="0">
+                  </a:ln>
+                </p:spPr>
+                <p:style>
+                  <a:lnRef idx="2">
+                    <a:schemeClr val="accent1">
+                      <a:shade val="50000"/>
+                    </a:schemeClr>
+                  </a:lnRef>
+                  <a:fillRef idx="1">
+                    <a:schemeClr val="accent1"/>
+                  </a:fillRef>
+                  <a:effectRef idx="0">
+                    <a:schemeClr val="accent1"/>
+                  </a:effectRef>
+                  <a:fontRef idx="minor">
+                    <a:schemeClr val="lt1"/>
+                  </a:fontRef>
+                </p:style>
+                <p:txBody>
+                  <a:bodyPr rtlCol="0" anchor="ctr"/>
+                  <a:lstStyle/>
+                  <a:p>
+                    <a:pPr algn="ctr"/>
+                    <a14:m>
+                      <m:oMathPara xmlns:m="http://schemas.openxmlformats.org/officeDocument/2006/math">
+                        <m:oMathParaPr>
+                          <m:jc m:val="centerGroup"/>
+                        </m:oMathParaPr>
+                        <m:oMath xmlns:m="http://schemas.openxmlformats.org/officeDocument/2006/math">
+                          <m:r>
+                            <a:rPr lang="en-US" i="1" dirty="0" smtClean="0">
+                              <a:solidFill>
+                                <a:schemeClr val="tx1"/>
+                              </a:solidFill>
+                              <a:latin typeface="Cambria Math" panose="02040503050406030204" pitchFamily="18" charset="0"/>
+                            </a:rPr>
+                            <m:t>𝑃</m:t>
+                          </m:r>
+                          <m:r>
+                            <a:rPr lang="en-US" i="1" baseline="-25000" dirty="0">
+                              <a:solidFill>
+                                <a:schemeClr val="tx1"/>
+                              </a:solidFill>
+                              <a:latin typeface="Cambria Math" panose="02040503050406030204" pitchFamily="18" charset="0"/>
+                            </a:rPr>
+                            <m:t>2</m:t>
+                          </m:r>
+                        </m:oMath>
+                      </m:oMathPara>
+                    </a14:m>
+                    <a:endParaRPr lang="en-US" dirty="0">
+                      <a:solidFill>
+                        <a:schemeClr val="tx1"/>
+                      </a:solidFill>
+                    </a:endParaRPr>
+                  </a:p>
+                </p:txBody>
+              </p:sp>
+            </mc:Choice>
+            <mc:Fallback>
+              <p:sp>
+                <p:nvSpPr>
+                  <p:cNvPr id="10" name="Rectangle 9">
+                    <a:extLst>
+                      <a:ext uri="{FF2B5EF4-FFF2-40B4-BE49-F238E27FC236}">
+                        <a16:creationId xmlns:a16="http://schemas.microsoft.com/office/drawing/2014/main" id="{4F9F89F7-56EA-4811-7AF8-CC1B32B84128}"/>
+                      </a:ext>
+                    </a:extLst>
+                  </p:cNvPr>
+                  <p:cNvSpPr>
+                    <a:spLocks noRot="1" noChangeAspect="1" noMove="1" noResize="1" noEditPoints="1" noAdjustHandles="1" noChangeArrowheads="1" noChangeShapeType="1" noTextEdit="1"/>
+                  </p:cNvSpPr>
+                  <p:nvPr/>
+                </p:nvSpPr>
+                <p:spPr>
+                  <a:xfrm>
+                    <a:off x="4878265" y="4692216"/>
+                    <a:ext cx="685800" cy="685800"/>
+                  </a:xfrm>
+                  <a:prstGeom prst="rect">
+                    <a:avLst/>
+                  </a:prstGeom>
+                  <a:blipFill>
+                    <a:blip r:embed="rId7"/>
+                    <a:stretch>
+                      <a:fillRect/>
+                    </a:stretch>
+                  </a:blipFill>
+                  <a:ln>
                     <a:solidFill>
                       <a:schemeClr val="tx1"/>
                     </a:solidFill>
-                  </a:rPr>
-                  <a:t>2</a:t>
-                </a:r>
-                <a:endParaRPr lang="en-US" dirty="0">
+                  </a:ln>
+                </p:spPr>
+                <p:txBody>
+                  <a:bodyPr/>
+                  <a:lstStyle/>
+                  <a:p>
+                    <a:r>
+                      <a:rPr lang="en-US">
+                        <a:noFill/>
+                      </a:rPr>
+                      <a:t> </a:t>
+                    </a:r>
+                  </a:p>
+                </p:txBody>
+              </p:sp>
+            </mc:Fallback>
+          </mc:AlternateContent>
+          <mc:AlternateContent xmlns:mc="http://schemas.openxmlformats.org/markup-compatibility/2006">
+            <mc:Choice xmlns:a14="http://schemas.microsoft.com/office/drawing/2010/main" Requires="a14">
+              <p:sp>
+                <p:nvSpPr>
+                  <p:cNvPr id="11" name="Rectangle 10">
+                    <a:extLst>
+                      <a:ext uri="{FF2B5EF4-FFF2-40B4-BE49-F238E27FC236}">
+                        <a16:creationId xmlns:a16="http://schemas.microsoft.com/office/drawing/2014/main" id="{18F2FA65-D9A5-E487-EFF3-6D9FC1143489}"/>
+                      </a:ext>
+                    </a:extLst>
+                  </p:cNvPr>
+                  <p:cNvSpPr/>
+                  <p:nvPr/>
+                </p:nvSpPr>
+                <p:spPr>
+                  <a:xfrm>
+                    <a:off x="7308389" y="4692216"/>
+                    <a:ext cx="685800" cy="685800"/>
+                  </a:xfrm>
+                  <a:prstGeom prst="rect">
+                    <a:avLst/>
+                  </a:prstGeom>
                   <a:solidFill>
-                    <a:schemeClr val="tx1"/>
+                    <a:schemeClr val="bg1"/>
                   </a:solidFill>
-                </a:endParaRPr>
-              </a:p>
-            </p:txBody>
-          </p:sp>
-          <p:sp>
-            <p:nvSpPr>
-              <p:cNvPr id="11" name="Rectangle 10">
-                <a:extLst>
-                  <a:ext uri="{FF2B5EF4-FFF2-40B4-BE49-F238E27FC236}">
-                    <a16:creationId xmlns:a16="http://schemas.microsoft.com/office/drawing/2014/main" id="{18F2FA65-D9A5-E487-EFF3-6D9FC1143489}"/>
-                  </a:ext>
-                </a:extLst>
-              </p:cNvPr>
-              <p:cNvSpPr/>
-              <p:nvPr/>
-            </p:nvSpPr>
-            <p:spPr>
-              <a:xfrm>
-                <a:off x="7308389" y="4692216"/>
-                <a:ext cx="685800" cy="685800"/>
-              </a:xfrm>
-              <a:prstGeom prst="rect">
-                <a:avLst/>
-              </a:prstGeom>
-              <a:solidFill>
-                <a:schemeClr val="bg1"/>
-              </a:solidFill>
-              <a:ln>
-                <a:solidFill>
-                  <a:schemeClr val="tx1"/>
-                </a:solidFill>
-              </a:ln>
-            </p:spPr>
-            <p:style>
-              <a:lnRef idx="2">
-                <a:schemeClr val="accent1">
-                  <a:shade val="50000"/>
-                </a:schemeClr>
-              </a:lnRef>
-              <a:fillRef idx="1">
-                <a:schemeClr val="accent1"/>
-              </a:fillRef>
-              <a:effectRef idx="0">
-                <a:schemeClr val="accent1"/>
-              </a:effectRef>
-              <a:fontRef idx="minor">
-                <a:schemeClr val="lt1"/>
-              </a:fontRef>
-            </p:style>
-            <p:txBody>
-              <a:bodyPr rtlCol="0" anchor="ctr"/>
-              <a:lstStyle/>
-              <a:p>
-                <a:pPr algn="ctr"/>
-                <a:r>
-                  <a:rPr lang="en-US" dirty="0">
+                  <a:ln>
                     <a:solidFill>
                       <a:schemeClr val="tx1"/>
                     </a:solidFill>
-                  </a:rPr>
-                  <a:t>Y</a:t>
-                </a:r>
-                <a:r>
-                  <a:rPr lang="en-US" baseline="-25000" dirty="0">
+                  </a:ln>
+                </p:spPr>
+                <p:style>
+                  <a:lnRef idx="2">
+                    <a:schemeClr val="accent1">
+                      <a:shade val="50000"/>
+                    </a:schemeClr>
+                  </a:lnRef>
+                  <a:fillRef idx="1">
+                    <a:schemeClr val="accent1"/>
+                  </a:fillRef>
+                  <a:effectRef idx="0">
+                    <a:schemeClr val="accent1"/>
+                  </a:effectRef>
+                  <a:fontRef idx="minor">
+                    <a:schemeClr val="lt1"/>
+                  </a:fontRef>
+                </p:style>
+                <p:txBody>
+                  <a:bodyPr rtlCol="0" anchor="ctr"/>
+                  <a:lstStyle/>
+                  <a:p>
+                    <a:pPr algn="ctr"/>
+                    <a14:m>
+                      <m:oMathPara xmlns:m="http://schemas.openxmlformats.org/officeDocument/2006/math">
+                        <m:oMathParaPr>
+                          <m:jc m:val="centerGroup"/>
+                        </m:oMathParaPr>
+                        <m:oMath xmlns:m="http://schemas.openxmlformats.org/officeDocument/2006/math">
+                          <m:sSub>
+                            <m:sSubPr>
+                              <m:ctrlPr>
+                                <a:rPr lang="en-US" b="0" i="1" smtClean="0">
+                                  <a:solidFill>
+                                    <a:schemeClr val="tx1"/>
+                                  </a:solidFill>
+                                  <a:latin typeface="Cambria Math" panose="02040503050406030204" pitchFamily="18" charset="0"/>
+                                </a:rPr>
+                              </m:ctrlPr>
+                            </m:sSubPr>
+                            <m:e>
+                              <m:acc>
+                                <m:accPr>
+                                  <m:chr m:val="̂"/>
+                                  <m:ctrlPr>
+                                    <a:rPr lang="en-US" b="0" i="1" smtClean="0">
+                                      <a:solidFill>
+                                        <a:schemeClr val="tx1"/>
+                                      </a:solidFill>
+                                      <a:latin typeface="Cambria Math" panose="02040503050406030204" pitchFamily="18" charset="0"/>
+                                    </a:rPr>
+                                  </m:ctrlPr>
+                                </m:accPr>
+                                <m:e>
+                                  <m:r>
+                                    <a:rPr lang="en-US" b="0" i="1" smtClean="0">
+                                      <a:solidFill>
+                                        <a:schemeClr val="tx1"/>
+                                      </a:solidFill>
+                                      <a:latin typeface="Cambria Math" panose="02040503050406030204" pitchFamily="18" charset="0"/>
+                                    </a:rPr>
+                                    <m:t>𝑦</m:t>
+                                  </m:r>
+                                </m:e>
+                              </m:acc>
+                            </m:e>
+                            <m:sub>
+                              <m:r>
+                                <a:rPr lang="en-US" b="0" i="1" smtClean="0">
+                                  <a:solidFill>
+                                    <a:schemeClr val="tx1"/>
+                                  </a:solidFill>
+                                  <a:latin typeface="Cambria Math" panose="02040503050406030204" pitchFamily="18" charset="0"/>
+                                </a:rPr>
+                                <m:t>2</m:t>
+                              </m:r>
+                            </m:sub>
+                          </m:sSub>
+                        </m:oMath>
+                      </m:oMathPara>
+                    </a14:m>
+                    <a:endParaRPr lang="en-US" b="0" dirty="0">
+                      <a:solidFill>
+                        <a:schemeClr val="tx1"/>
+                      </a:solidFill>
+                    </a:endParaRPr>
+                  </a:p>
+                </p:txBody>
+              </p:sp>
+            </mc:Choice>
+            <mc:Fallback>
+              <p:sp>
+                <p:nvSpPr>
+                  <p:cNvPr id="11" name="Rectangle 10">
+                    <a:extLst>
+                      <a:ext uri="{FF2B5EF4-FFF2-40B4-BE49-F238E27FC236}">
+                        <a16:creationId xmlns:a16="http://schemas.microsoft.com/office/drawing/2014/main" id="{18F2FA65-D9A5-E487-EFF3-6D9FC1143489}"/>
+                      </a:ext>
+                    </a:extLst>
+                  </p:cNvPr>
+                  <p:cNvSpPr>
+                    <a:spLocks noRot="1" noChangeAspect="1" noMove="1" noResize="1" noEditPoints="1" noAdjustHandles="1" noChangeArrowheads="1" noChangeShapeType="1" noTextEdit="1"/>
+                  </p:cNvSpPr>
+                  <p:nvPr/>
+                </p:nvSpPr>
+                <p:spPr>
+                  <a:xfrm>
+                    <a:off x="7308389" y="4692216"/>
+                    <a:ext cx="685800" cy="685800"/>
+                  </a:xfrm>
+                  <a:prstGeom prst="rect">
+                    <a:avLst/>
+                  </a:prstGeom>
+                  <a:blipFill>
+                    <a:blip r:embed="rId8"/>
+                    <a:stretch>
+                      <a:fillRect/>
+                    </a:stretch>
+                  </a:blipFill>
+                  <a:ln>
                     <a:solidFill>
                       <a:schemeClr val="tx1"/>
                     </a:solidFill>
-                  </a:rPr>
-                  <a:t>2</a:t>
-                </a:r>
-                <a:endParaRPr lang="en-US" dirty="0">
-                  <a:solidFill>
-                    <a:schemeClr val="tx1"/>
-                  </a:solidFill>
-                </a:endParaRPr>
-              </a:p>
-            </p:txBody>
-          </p:sp>
+                  </a:ln>
+                </p:spPr>
+                <p:txBody>
+                  <a:bodyPr/>
+                  <a:lstStyle/>
+                  <a:p>
+                    <a:r>
+                      <a:rPr lang="en-US">
+                        <a:noFill/>
+                      </a:rPr>
+                      <a:t> </a:t>
+                    </a:r>
+                  </a:p>
+                </p:txBody>
+              </p:sp>
+            </mc:Fallback>
+          </mc:AlternateContent>
           <p:cxnSp>
             <p:nvCxnSpPr>
               <p:cNvPr id="13" name="Straight Arrow Connector 12">
@@ -4836,6 +5232,215 @@
           </p:grpSp>
         </p:grpSp>
       </p:grpSp>
+      <p:sp>
+        <p:nvSpPr>
+          <p:cNvPr id="2" name="4-point Star 1">
+            <a:extLst>
+              <a:ext uri="{FF2B5EF4-FFF2-40B4-BE49-F238E27FC236}">
+                <a16:creationId xmlns:a16="http://schemas.microsoft.com/office/drawing/2014/main" id="{A371F127-522C-DE9F-2A91-67E668DBFF19}"/>
+              </a:ext>
+            </a:extLst>
+          </p:cNvPr>
+          <p:cNvSpPr/>
+          <p:nvPr/>
+        </p:nvSpPr>
+        <p:spPr>
+          <a:xfrm>
+            <a:off x="3298921" y="3027630"/>
+            <a:ext cx="164123" cy="164123"/>
+          </a:xfrm>
+          <a:prstGeom prst="star4">
+            <a:avLst/>
+          </a:prstGeom>
+          <a:solidFill>
+            <a:srgbClr val="C00000"/>
+          </a:solidFill>
+          <a:ln>
+            <a:noFill/>
+          </a:ln>
+        </p:spPr>
+        <p:style>
+          <a:lnRef idx="2">
+            <a:schemeClr val="accent1">
+              <a:shade val="50000"/>
+            </a:schemeClr>
+          </a:lnRef>
+          <a:fillRef idx="1">
+            <a:schemeClr val="accent1"/>
+          </a:fillRef>
+          <a:effectRef idx="0">
+            <a:schemeClr val="accent1"/>
+          </a:effectRef>
+          <a:fontRef idx="minor">
+            <a:schemeClr val="lt1"/>
+          </a:fontRef>
+        </p:style>
+        <p:txBody>
+          <a:bodyPr rtlCol="0" anchor="ctr"/>
+          <a:lstStyle/>
+          <a:p>
+            <a:pPr algn="ctr"/>
+            <a:endParaRPr lang="en-US"/>
+          </a:p>
+        </p:txBody>
+      </p:sp>
+      <p:sp>
+        <p:nvSpPr>
+          <p:cNvPr id="3" name="TextBox 2">
+            <a:extLst>
+              <a:ext uri="{FF2B5EF4-FFF2-40B4-BE49-F238E27FC236}">
+                <a16:creationId xmlns:a16="http://schemas.microsoft.com/office/drawing/2014/main" id="{584818AB-82B6-0281-A7D9-0DEE978BACAC}"/>
+              </a:ext>
+            </a:extLst>
+          </p:cNvPr>
+          <p:cNvSpPr txBox="1"/>
+          <p:nvPr/>
+        </p:nvSpPr>
+        <p:spPr>
+          <a:xfrm>
+            <a:off x="2372957" y="2933673"/>
+            <a:ext cx="974947" cy="369332"/>
+          </a:xfrm>
+          <a:prstGeom prst="rect">
+            <a:avLst/>
+          </a:prstGeom>
+          <a:noFill/>
+        </p:spPr>
+        <p:txBody>
+          <a:bodyPr wrap="none" rtlCol="0">
+            <a:spAutoFit/>
+          </a:bodyPr>
+          <a:lstStyle/>
+          <a:p>
+            <a:r>
+              <a:rPr lang="en-US" b="1" dirty="0"/>
+              <a:t>Model 1</a:t>
+            </a:r>
+          </a:p>
+        </p:txBody>
+      </p:sp>
+      <p:sp>
+        <p:nvSpPr>
+          <p:cNvPr id="4" name="TextBox 3">
+            <a:extLst>
+              <a:ext uri="{FF2B5EF4-FFF2-40B4-BE49-F238E27FC236}">
+                <a16:creationId xmlns:a16="http://schemas.microsoft.com/office/drawing/2014/main" id="{EAFBEEEE-A666-CFA9-F97C-B72507015A34}"/>
+              </a:ext>
+            </a:extLst>
+          </p:cNvPr>
+          <p:cNvSpPr txBox="1"/>
+          <p:nvPr/>
+        </p:nvSpPr>
+        <p:spPr>
+          <a:xfrm>
+            <a:off x="2372957" y="4457727"/>
+            <a:ext cx="974947" cy="369332"/>
+          </a:xfrm>
+          <a:prstGeom prst="rect">
+            <a:avLst/>
+          </a:prstGeom>
+          <a:noFill/>
+        </p:spPr>
+        <p:txBody>
+          <a:bodyPr wrap="none" rtlCol="0">
+            <a:spAutoFit/>
+          </a:bodyPr>
+          <a:lstStyle/>
+          <a:p>
+            <a:r>
+              <a:rPr lang="en-US" b="1" dirty="0"/>
+              <a:t>Model 2</a:t>
+            </a:r>
+          </a:p>
+        </p:txBody>
+      </p:sp>
+      <p:sp>
+        <p:nvSpPr>
+          <p:cNvPr id="12" name="4-point Star 11">
+            <a:extLst>
+              <a:ext uri="{FF2B5EF4-FFF2-40B4-BE49-F238E27FC236}">
+                <a16:creationId xmlns:a16="http://schemas.microsoft.com/office/drawing/2014/main" id="{A648FB0D-C485-CDC0-5529-D465135D5EFF}"/>
+              </a:ext>
+            </a:extLst>
+          </p:cNvPr>
+          <p:cNvSpPr/>
+          <p:nvPr/>
+        </p:nvSpPr>
+        <p:spPr>
+          <a:xfrm>
+            <a:off x="5561589" y="5622630"/>
+            <a:ext cx="164123" cy="164123"/>
+          </a:xfrm>
+          <a:prstGeom prst="star4">
+            <a:avLst/>
+          </a:prstGeom>
+          <a:solidFill>
+            <a:srgbClr val="C00000"/>
+          </a:solidFill>
+          <a:ln>
+            <a:noFill/>
+          </a:ln>
+        </p:spPr>
+        <p:style>
+          <a:lnRef idx="2">
+            <a:schemeClr val="accent1">
+              <a:shade val="50000"/>
+            </a:schemeClr>
+          </a:lnRef>
+          <a:fillRef idx="1">
+            <a:schemeClr val="accent1"/>
+          </a:fillRef>
+          <a:effectRef idx="0">
+            <a:schemeClr val="accent1"/>
+          </a:effectRef>
+          <a:fontRef idx="minor">
+            <a:schemeClr val="lt1"/>
+          </a:fontRef>
+        </p:style>
+        <p:txBody>
+          <a:bodyPr rtlCol="0" anchor="ctr"/>
+          <a:lstStyle/>
+          <a:p>
+            <a:pPr algn="ctr"/>
+            <a:endParaRPr lang="en-US"/>
+          </a:p>
+        </p:txBody>
+      </p:sp>
+      <p:sp>
+        <p:nvSpPr>
+          <p:cNvPr id="15" name="TextBox 14">
+            <a:extLst>
+              <a:ext uri="{FF2B5EF4-FFF2-40B4-BE49-F238E27FC236}">
+                <a16:creationId xmlns:a16="http://schemas.microsoft.com/office/drawing/2014/main" id="{B275D97C-066F-0610-FC6C-E0EB28EA5BFF}"/>
+              </a:ext>
+            </a:extLst>
+          </p:cNvPr>
+          <p:cNvSpPr txBox="1"/>
+          <p:nvPr/>
+        </p:nvSpPr>
+        <p:spPr>
+          <a:xfrm>
+            <a:off x="5725712" y="5566192"/>
+            <a:ext cx="2669385" cy="276999"/>
+          </a:xfrm>
+          <a:prstGeom prst="rect">
+            <a:avLst/>
+          </a:prstGeom>
+          <a:noFill/>
+        </p:spPr>
+        <p:txBody>
+          <a:bodyPr wrap="none" rtlCol="0">
+            <a:spAutoFit/>
+          </a:bodyPr>
+          <a:lstStyle/>
+          <a:p>
+            <a:r>
+              <a:rPr lang="en-US" sz="1200" dirty="0"/>
+              <a:t>Only Model 1 is outputted after training</a:t>
+            </a:r>
+          </a:p>
+        </p:txBody>
+      </p:sp>
     </p:spTree>
     <p:extLst>
       <p:ext uri="{BB962C8B-B14F-4D97-AF65-F5344CB8AC3E}">

</xml_diff>